<commit_message>
mein Teil der Projektskizze
</commit_message>
<xml_diff>
--- a/Documents/Projektskizze/Projektskizze_Präsentation_v1.pptx
+++ b/Documents/Projektskizze/Projektskizze_Präsentation_v1.pptx
@@ -301,7 +301,7 @@
           <a:p>
             <a:fld id="{1BA50D42-C9CD-4801-B293-61D1F53EC57E}" type="datetimeFigureOut">
               <a:rPr lang="de-DE" smtClean="0"/>
-              <a:t>25.09.2014</a:t>
+              <a:t>25/09/14</a:t>
             </a:fld>
             <a:endParaRPr lang="de-DE"/>
           </a:p>
@@ -324,7 +324,7 @@
           <a:p>
             <a:fld id="{6C6AE60A-B69C-4790-82F7-3882EDF23186}" type="slidenum">
               <a:rPr lang="de-DE" smtClean="0"/>
-              <a:t>‹#›</a:t>
+              <a:t>‹Nr.›</a:t>
             </a:fld>
             <a:endParaRPr lang="de-DE"/>
           </a:p>
@@ -466,7 +466,7 @@
           <a:p>
             <a:fld id="{1BA50D42-C9CD-4801-B293-61D1F53EC57E}" type="datetimeFigureOut">
               <a:rPr lang="de-DE" smtClean="0"/>
-              <a:t>25.09.2014</a:t>
+              <a:t>25/09/14</a:t>
             </a:fld>
             <a:endParaRPr lang="de-DE"/>
           </a:p>
@@ -508,7 +508,7 @@
           <a:p>
             <a:fld id="{6C6AE60A-B69C-4790-82F7-3882EDF23186}" type="slidenum">
               <a:rPr lang="de-DE" smtClean="0"/>
-              <a:t>‹#›</a:t>
+              <a:t>‹Nr.›</a:t>
             </a:fld>
             <a:endParaRPr lang="de-DE"/>
           </a:p>
@@ -641,7 +641,7 @@
           <a:p>
             <a:fld id="{1BA50D42-C9CD-4801-B293-61D1F53EC57E}" type="datetimeFigureOut">
               <a:rPr lang="de-DE" smtClean="0"/>
-              <a:t>25.09.2014</a:t>
+              <a:t>25/09/14</a:t>
             </a:fld>
             <a:endParaRPr lang="de-DE"/>
           </a:p>
@@ -683,7 +683,7 @@
           <a:p>
             <a:fld id="{6C6AE60A-B69C-4790-82F7-3882EDF23186}" type="slidenum">
               <a:rPr lang="de-DE" smtClean="0"/>
-              <a:t>‹#›</a:t>
+              <a:t>‹Nr.›</a:t>
             </a:fld>
             <a:endParaRPr lang="de-DE"/>
           </a:p>
@@ -806,7 +806,7 @@
           <a:p>
             <a:fld id="{1BA50D42-C9CD-4801-B293-61D1F53EC57E}" type="datetimeFigureOut">
               <a:rPr lang="de-DE" smtClean="0"/>
-              <a:t>25.09.2014</a:t>
+              <a:t>25/09/14</a:t>
             </a:fld>
             <a:endParaRPr lang="de-DE"/>
           </a:p>
@@ -848,7 +848,7 @@
           <a:p>
             <a:fld id="{6C6AE60A-B69C-4790-82F7-3882EDF23186}" type="slidenum">
               <a:rPr lang="de-DE" smtClean="0"/>
-              <a:t>‹#›</a:t>
+              <a:t>‹Nr.›</a:t>
             </a:fld>
             <a:endParaRPr lang="de-DE"/>
           </a:p>
@@ -1045,7 +1045,7 @@
           <a:p>
             <a:fld id="{1BA50D42-C9CD-4801-B293-61D1F53EC57E}" type="datetimeFigureOut">
               <a:rPr lang="de-DE" smtClean="0"/>
-              <a:t>25.09.2014</a:t>
+              <a:t>25/09/14</a:t>
             </a:fld>
             <a:endParaRPr lang="de-DE"/>
           </a:p>
@@ -1087,7 +1087,7 @@
           <a:p>
             <a:fld id="{6C6AE60A-B69C-4790-82F7-3882EDF23186}" type="slidenum">
               <a:rPr lang="de-DE" smtClean="0"/>
-              <a:t>‹#›</a:t>
+              <a:t>‹Nr.›</a:t>
             </a:fld>
             <a:endParaRPr lang="de-DE"/>
           </a:p>
@@ -1135,7 +1135,7 @@
           <a:p>
             <a:fld id="{1BA50D42-C9CD-4801-B293-61D1F53EC57E}" type="datetimeFigureOut">
               <a:rPr lang="de-DE" smtClean="0"/>
-              <a:t>25.09.2014</a:t>
+              <a:t>25/09/14</a:t>
             </a:fld>
             <a:endParaRPr lang="de-DE"/>
           </a:p>
@@ -1177,7 +1177,7 @@
           <a:p>
             <a:fld id="{6C6AE60A-B69C-4790-82F7-3882EDF23186}" type="slidenum">
               <a:rPr lang="de-DE" smtClean="0"/>
-              <a:t>‹#›</a:t>
+              <a:t>‹Nr.›</a:t>
             </a:fld>
             <a:endParaRPr lang="de-DE"/>
           </a:p>
@@ -1509,7 +1509,7 @@
           <a:p>
             <a:fld id="{1BA50D42-C9CD-4801-B293-61D1F53EC57E}" type="datetimeFigureOut">
               <a:rPr lang="de-DE" smtClean="0"/>
-              <a:t>25.09.2014</a:t>
+              <a:t>25/09/14</a:t>
             </a:fld>
             <a:endParaRPr lang="de-DE"/>
           </a:p>
@@ -1551,7 +1551,7 @@
           <a:p>
             <a:fld id="{6C6AE60A-B69C-4790-82F7-3882EDF23186}" type="slidenum">
               <a:rPr lang="de-DE" smtClean="0"/>
-              <a:t>‹#›</a:t>
+              <a:t>‹Nr.›</a:t>
             </a:fld>
             <a:endParaRPr lang="de-DE"/>
           </a:p>
@@ -1764,7 +1764,7 @@
           <a:p>
             <a:fld id="{1BA50D42-C9CD-4801-B293-61D1F53EC57E}" type="datetimeFigureOut">
               <a:rPr lang="de-DE" smtClean="0"/>
-              <a:t>25.09.2014</a:t>
+              <a:t>25/09/14</a:t>
             </a:fld>
             <a:endParaRPr lang="de-DE"/>
           </a:p>
@@ -1806,7 +1806,7 @@
           <a:p>
             <a:fld id="{6C6AE60A-B69C-4790-82F7-3882EDF23186}" type="slidenum">
               <a:rPr lang="de-DE" smtClean="0"/>
-              <a:t>‹#›</a:t>
+              <a:t>‹Nr.›</a:t>
             </a:fld>
             <a:endParaRPr lang="de-DE"/>
           </a:p>
@@ -1854,7 +1854,7 @@
           <a:p>
             <a:fld id="{1BA50D42-C9CD-4801-B293-61D1F53EC57E}" type="datetimeFigureOut">
               <a:rPr lang="de-DE" smtClean="0"/>
-              <a:t>25.09.2014</a:t>
+              <a:t>25/09/14</a:t>
             </a:fld>
             <a:endParaRPr lang="de-DE"/>
           </a:p>
@@ -1896,7 +1896,7 @@
           <a:p>
             <a:fld id="{6C6AE60A-B69C-4790-82F7-3882EDF23186}" type="slidenum">
               <a:rPr lang="de-DE" smtClean="0"/>
-              <a:t>‹#›</a:t>
+              <a:t>‹Nr.›</a:t>
             </a:fld>
             <a:endParaRPr lang="de-DE"/>
           </a:p>
@@ -2128,7 +2128,7 @@
           <a:p>
             <a:fld id="{1BA50D42-C9CD-4801-B293-61D1F53EC57E}" type="datetimeFigureOut">
               <a:rPr lang="de-DE" smtClean="0"/>
-              <a:t>25.09.2014</a:t>
+              <a:t>25/09/14</a:t>
             </a:fld>
             <a:endParaRPr lang="de-DE"/>
           </a:p>
@@ -2170,7 +2170,7 @@
           <a:p>
             <a:fld id="{6C6AE60A-B69C-4790-82F7-3882EDF23186}" type="slidenum">
               <a:rPr lang="de-DE" smtClean="0"/>
-              <a:t>‹#›</a:t>
+              <a:t>‹Nr.›</a:t>
             </a:fld>
             <a:endParaRPr lang="de-DE"/>
           </a:p>
@@ -2400,7 +2400,7 @@
           <a:p>
             <a:fld id="{1BA50D42-C9CD-4801-B293-61D1F53EC57E}" type="datetimeFigureOut">
               <a:rPr lang="de-DE" smtClean="0"/>
-              <a:t>25.09.2014</a:t>
+              <a:t>25/09/14</a:t>
             </a:fld>
             <a:endParaRPr lang="de-DE"/>
           </a:p>
@@ -2442,7 +2442,7 @@
           <a:p>
             <a:fld id="{6C6AE60A-B69C-4790-82F7-3882EDF23186}" type="slidenum">
               <a:rPr lang="de-DE" smtClean="0"/>
-              <a:t>‹#›</a:t>
+              <a:t>‹Nr.›</a:t>
             </a:fld>
             <a:endParaRPr lang="de-DE"/>
           </a:p>
@@ -2700,7 +2700,7 @@
           <a:p>
             <a:fld id="{1BA50D42-C9CD-4801-B293-61D1F53EC57E}" type="datetimeFigureOut">
               <a:rPr lang="de-DE" smtClean="0"/>
-              <a:t>25.09.2014</a:t>
+              <a:t>25/09/14</a:t>
             </a:fld>
             <a:endParaRPr lang="de-DE"/>
           </a:p>
@@ -2739,7 +2739,7 @@
           <a:p>
             <a:fld id="{6C6AE60A-B69C-4790-82F7-3882EDF23186}" type="slidenum">
               <a:rPr lang="de-DE" smtClean="0"/>
-              <a:t>‹#›</a:t>
+              <a:t>‹Nr.›</a:t>
             </a:fld>
             <a:endParaRPr lang="de-DE"/>
           </a:p>
@@ -3227,7 +3227,7 @@
   <p:timing>
     <p:tnLst>
       <p:par>
-        <p:cTn id="1" dur="indefinite" restart="never" nodeType="tmRoot"/>
+        <p:cTn xmlns:p14="http://schemas.microsoft.com/office/powerpoint/2010/main" id="1" dur="indefinite" restart="never" nodeType="tmRoot"/>
       </p:par>
     </p:tnLst>
   </p:timing>
@@ -3301,7 +3301,27 @@
           <a:bodyPr/>
           <a:lstStyle/>
           <a:p>
-            <a:endParaRPr lang="de-CH" dirty="0"/>
+            <a:r>
+              <a:rPr lang="de-CH" dirty="0" smtClean="0"/>
+              <a:t>Mobile App</a:t>
+            </a:r>
+            <a:r>
+              <a:rPr lang="de-CH" dirty="0" smtClean="0"/>
+              <a:t>likation</a:t>
+            </a:r>
+          </a:p>
+          <a:p>
+            <a:r>
+              <a:rPr lang="de-CH" dirty="0" smtClean="0"/>
+              <a:t>Spiel</a:t>
+            </a:r>
+          </a:p>
+          <a:p>
+            <a:r>
+              <a:rPr lang="de-CH" dirty="0" smtClean="0"/>
+              <a:t>Docker</a:t>
+            </a:r>
+            <a:endParaRPr lang="de-CH" dirty="0" smtClean="0"/>
           </a:p>
         </p:txBody>
       </p:sp>
@@ -3318,7 +3338,7 @@
   <p:timing>
     <p:tnLst>
       <p:par>
-        <p:cTn id="1" dur="indefinite" restart="never" nodeType="tmRoot"/>
+        <p:cTn xmlns:p14="http://schemas.microsoft.com/office/powerpoint/2010/main" id="1" dur="indefinite" restart="never" nodeType="tmRoot"/>
       </p:par>
     </p:tnLst>
   </p:timing>
@@ -3392,6 +3412,22 @@
           <a:bodyPr/>
           <a:lstStyle/>
           <a:p>
+            <a:r>
+              <a:rPr lang="de-CH" dirty="0" smtClean="0"/>
+              <a:t>Ziel</a:t>
+            </a:r>
+          </a:p>
+          <a:p>
+            <a:r>
+              <a:rPr lang="de-CH" dirty="0" smtClean="0"/>
+              <a:t>Ablauf</a:t>
+            </a:r>
+          </a:p>
+          <a:p>
+            <a:r>
+              <a:rPr lang="de-CH" smtClean="0"/>
+              <a:t>Ende</a:t>
+            </a:r>
             <a:endParaRPr lang="de-CH" dirty="0"/>
           </a:p>
         </p:txBody>
@@ -3409,7 +3445,7 @@
   <p:timing>
     <p:tnLst>
       <p:par>
-        <p:cTn id="1" dur="indefinite" restart="never" nodeType="tmRoot"/>
+        <p:cTn xmlns:p14="http://schemas.microsoft.com/office/powerpoint/2010/main" id="1" dur="indefinite" restart="never" nodeType="tmRoot"/>
       </p:par>
     </p:tnLst>
   </p:timing>
@@ -3500,7 +3536,7 @@
   <p:timing>
     <p:tnLst>
       <p:par>
-        <p:cTn id="1" dur="indefinite" restart="never" nodeType="tmRoot"/>
+        <p:cTn xmlns:p14="http://schemas.microsoft.com/office/powerpoint/2010/main" id="1" dur="indefinite" restart="never" nodeType="tmRoot"/>
       </p:par>
     </p:tnLst>
   </p:timing>
@@ -3591,7 +3627,7 @@
   <p:timing>
     <p:tnLst>
       <p:par>
-        <p:cTn id="1" dur="indefinite" restart="never" nodeType="tmRoot"/>
+        <p:cTn xmlns:p14="http://schemas.microsoft.com/office/powerpoint/2010/main" id="1" dur="indefinite" restart="never" nodeType="tmRoot"/>
       </p:par>
     </p:tnLst>
   </p:timing>
@@ -3682,7 +3718,7 @@
   <p:timing>
     <p:tnLst>
       <p:par>
-        <p:cTn id="1" dur="indefinite" restart="never" nodeType="tmRoot"/>
+        <p:cTn xmlns:p14="http://schemas.microsoft.com/office/powerpoint/2010/main" id="1" dur="indefinite" restart="never" nodeType="tmRoot"/>
       </p:par>
     </p:tnLst>
   </p:timing>
@@ -3773,7 +3809,7 @@
   <p:timing>
     <p:tnLst>
       <p:par>
-        <p:cTn id="1" dur="indefinite" restart="never" nodeType="tmRoot"/>
+        <p:cTn xmlns:p14="http://schemas.microsoft.com/office/powerpoint/2010/main" id="1" dur="indefinite" restart="never" nodeType="tmRoot"/>
       </p:par>
     </p:tnLst>
   </p:timing>
@@ -3864,7 +3900,7 @@
   <p:timing>
     <p:tnLst>
       <p:par>
-        <p:cTn id="1" dur="indefinite" restart="never" nodeType="tmRoot"/>
+        <p:cTn xmlns:p14="http://schemas.microsoft.com/office/powerpoint/2010/main" id="1" dur="indefinite" restart="never" nodeType="tmRoot"/>
       </p:par>
     </p:tnLst>
   </p:timing>

</xml_diff>

<commit_message>
Master in Folie angepasst
</commit_message>
<xml_diff>
--- a/Documents/Projektskizze/Projektskizze_Präsentation_v1.pptx
+++ b/Documents/Projektskizze/Projektskizze_Präsentation_v1.pptx
@@ -8,11 +8,12 @@
     <p:sldId id="256" r:id="rId2"/>
     <p:sldId id="257" r:id="rId3"/>
     <p:sldId id="258" r:id="rId4"/>
-    <p:sldId id="259" r:id="rId5"/>
-    <p:sldId id="260" r:id="rId6"/>
-    <p:sldId id="261" r:id="rId7"/>
-    <p:sldId id="262" r:id="rId8"/>
-    <p:sldId id="263" r:id="rId9"/>
+    <p:sldId id="264" r:id="rId5"/>
+    <p:sldId id="259" r:id="rId6"/>
+    <p:sldId id="260" r:id="rId7"/>
+    <p:sldId id="261" r:id="rId8"/>
+    <p:sldId id="262" r:id="rId9"/>
+    <p:sldId id="263" r:id="rId10"/>
   </p:sldIdLst>
   <p:sldSz cx="9144000" cy="6858000" type="screen4x3"/>
   <p:notesSz cx="6858000" cy="9144000"/>
@@ -111,6 +112,22 @@
       </a:defRPr>
     </a:lvl9pPr>
   </p:defaultTextStyle>
+  <p:extLst>
+    <p:ext uri="{EFAFB233-063F-42B5-8137-9DF3F51BA10A}">
+      <p15:sldGuideLst xmlns:p15="http://schemas.microsoft.com/office/powerpoint/2012/main">
+        <p15:guide id="1" orient="horz" pos="2160">
+          <p15:clr>
+            <a:srgbClr val="A4A3A4"/>
+          </p15:clr>
+        </p15:guide>
+        <p15:guide id="2" pos="2880">
+          <p15:clr>
+            <a:srgbClr val="A4A3A4"/>
+          </p15:clr>
+        </p15:guide>
+      </p15:sldGuideLst>
+    </p:ext>
+  </p:extLst>
 </p:presentation>
 </file>
 
@@ -294,14 +311,22 @@
             <p:ph type="dt" sz="half" idx="10"/>
           </p:nvPr>
         </p:nvSpPr>
-        <p:spPr/>
+        <p:spPr>
+          <a:xfrm>
+            <a:off x="6007690" y="548797"/>
+            <a:ext cx="1189132" cy="297918"/>
+          </a:xfrm>
+          <a:prstGeom prst="rect">
+            <a:avLst/>
+          </a:prstGeom>
+        </p:spPr>
         <p:txBody>
           <a:bodyPr/>
           <a:lstStyle/>
           <a:p>
             <a:fld id="{1BA50D42-C9CD-4801-B293-61D1F53EC57E}" type="datetimeFigureOut">
               <a:rPr lang="de-DE" smtClean="0"/>
-              <a:t>25/09/14</a:t>
+              <a:t>27.09.2014</a:t>
             </a:fld>
             <a:endParaRPr lang="de-DE"/>
           </a:p>
@@ -317,7 +342,15 @@
             <p:ph type="sldNum" sz="quarter" idx="11"/>
           </p:nvPr>
         </p:nvSpPr>
-        <p:spPr/>
+        <p:spPr>
+          <a:xfrm>
+            <a:off x="7314415" y="548797"/>
+            <a:ext cx="941203" cy="301752"/>
+          </a:xfrm>
+          <a:prstGeom prst="rect">
+            <a:avLst/>
+          </a:prstGeom>
+        </p:spPr>
         <p:txBody>
           <a:bodyPr/>
           <a:lstStyle/>
@@ -340,7 +373,15 @@
             <p:ph type="ftr" sz="quarter" idx="12"/>
           </p:nvPr>
         </p:nvSpPr>
-        <p:spPr/>
+        <p:spPr>
+          <a:xfrm>
+            <a:off x="6008688" y="855956"/>
+            <a:ext cx="2246489" cy="301227"/>
+          </a:xfrm>
+          <a:prstGeom prst="rect">
+            <a:avLst/>
+          </a:prstGeom>
+        </p:spPr>
         <p:txBody>
           <a:bodyPr/>
           <a:lstStyle/>
@@ -354,6 +395,13 @@
   <p:clrMapOvr>
     <a:masterClrMapping/>
   </p:clrMapOvr>
+  <p:timing>
+    <p:tnLst>
+      <p:par>
+        <p:cTn id="1" dur="indefinite" restart="never" nodeType="tmRoot"/>
+      </p:par>
+    </p:tnLst>
+  </p:timing>
 </p:sldLayout>
 </file>
 
@@ -459,14 +507,22 @@
             <p:ph type="dt" sz="half" idx="10"/>
           </p:nvPr>
         </p:nvSpPr>
-        <p:spPr/>
+        <p:spPr>
+          <a:xfrm>
+            <a:off x="6007690" y="548797"/>
+            <a:ext cx="1189132" cy="297918"/>
+          </a:xfrm>
+          <a:prstGeom prst="rect">
+            <a:avLst/>
+          </a:prstGeom>
+        </p:spPr>
         <p:txBody>
           <a:bodyPr/>
           <a:lstStyle/>
           <a:p>
             <a:fld id="{1BA50D42-C9CD-4801-B293-61D1F53EC57E}" type="datetimeFigureOut">
               <a:rPr lang="de-DE" smtClean="0"/>
-              <a:t>25/09/14</a:t>
+              <a:t>27.09.2014</a:t>
             </a:fld>
             <a:endParaRPr lang="de-DE"/>
           </a:p>
@@ -482,7 +538,15 @@
             <p:ph type="ftr" sz="quarter" idx="11"/>
           </p:nvPr>
         </p:nvSpPr>
-        <p:spPr/>
+        <p:spPr>
+          <a:xfrm>
+            <a:off x="6008688" y="855956"/>
+            <a:ext cx="2246489" cy="301227"/>
+          </a:xfrm>
+          <a:prstGeom prst="rect">
+            <a:avLst/>
+          </a:prstGeom>
+        </p:spPr>
         <p:txBody>
           <a:bodyPr/>
           <a:lstStyle/>
@@ -501,7 +565,15 @@
             <p:ph type="sldNum" sz="quarter" idx="12"/>
           </p:nvPr>
         </p:nvSpPr>
-        <p:spPr/>
+        <p:spPr>
+          <a:xfrm>
+            <a:off x="7314415" y="548797"/>
+            <a:ext cx="941203" cy="301752"/>
+          </a:xfrm>
+          <a:prstGeom prst="rect">
+            <a:avLst/>
+          </a:prstGeom>
+        </p:spPr>
         <p:txBody>
           <a:bodyPr/>
           <a:lstStyle/>
@@ -634,14 +706,22 @@
             <p:ph type="dt" sz="half" idx="10"/>
           </p:nvPr>
         </p:nvSpPr>
-        <p:spPr/>
+        <p:spPr>
+          <a:xfrm>
+            <a:off x="6007690" y="548797"/>
+            <a:ext cx="1189132" cy="297918"/>
+          </a:xfrm>
+          <a:prstGeom prst="rect">
+            <a:avLst/>
+          </a:prstGeom>
+        </p:spPr>
         <p:txBody>
           <a:bodyPr/>
           <a:lstStyle/>
           <a:p>
             <a:fld id="{1BA50D42-C9CD-4801-B293-61D1F53EC57E}" type="datetimeFigureOut">
               <a:rPr lang="de-DE" smtClean="0"/>
-              <a:t>25/09/14</a:t>
+              <a:t>27.09.2014</a:t>
             </a:fld>
             <a:endParaRPr lang="de-DE"/>
           </a:p>
@@ -657,7 +737,15 @@
             <p:ph type="ftr" sz="quarter" idx="11"/>
           </p:nvPr>
         </p:nvSpPr>
-        <p:spPr/>
+        <p:spPr>
+          <a:xfrm>
+            <a:off x="6008688" y="855956"/>
+            <a:ext cx="2246489" cy="301227"/>
+          </a:xfrm>
+          <a:prstGeom prst="rect">
+            <a:avLst/>
+          </a:prstGeom>
+        </p:spPr>
         <p:txBody>
           <a:bodyPr/>
           <a:lstStyle/>
@@ -676,7 +764,15 @@
             <p:ph type="sldNum" sz="quarter" idx="12"/>
           </p:nvPr>
         </p:nvSpPr>
-        <p:spPr/>
+        <p:spPr>
+          <a:xfrm>
+            <a:off x="7314415" y="548797"/>
+            <a:ext cx="941203" cy="301752"/>
+          </a:xfrm>
+          <a:prstGeom prst="rect">
+            <a:avLst/>
+          </a:prstGeom>
+        </p:spPr>
         <p:txBody>
           <a:bodyPr/>
           <a:lstStyle/>
@@ -724,34 +820,39 @@
             <p:ph type="title"/>
           </p:nvPr>
         </p:nvSpPr>
+        <p:spPr>
+          <a:xfrm>
+            <a:off x="538480" y="330687"/>
+            <a:ext cx="7691120" cy="1010081"/>
+          </a:xfrm>
+        </p:spPr>
+        <p:txBody>
+          <a:bodyPr/>
+          <a:lstStyle/>
+          <a:p>
+            <a:r>
+              <a:rPr lang="en-US" smtClean="0"/>
+              <a:t>Click to edit Master title style</a:t>
+            </a:r>
+            <a:endParaRPr lang="en-US"/>
+          </a:p>
+        </p:txBody>
+      </p:sp>
+      <p:sp>
+        <p:nvSpPr>
+          <p:cNvPr id="3" name="Content Placeholder 2"/>
+          <p:cNvSpPr>
+            <a:spLocks noGrp="1"/>
+          </p:cNvSpPr>
+          <p:nvPr>
+            <p:ph idx="1"/>
+          </p:nvPr>
+        </p:nvSpPr>
         <p:spPr/>
         <p:txBody>
           <a:bodyPr/>
           <a:lstStyle/>
           <a:p>
-            <a:r>
-              <a:rPr lang="en-US" smtClean="0"/>
-              <a:t>Click to edit Master title style</a:t>
-            </a:r>
-            <a:endParaRPr lang="en-US"/>
-          </a:p>
-        </p:txBody>
-      </p:sp>
-      <p:sp>
-        <p:nvSpPr>
-          <p:cNvPr id="3" name="Content Placeholder 2"/>
-          <p:cNvSpPr>
-            <a:spLocks noGrp="1"/>
-          </p:cNvSpPr>
-          <p:nvPr>
-            <p:ph idx="1"/>
-          </p:nvPr>
-        </p:nvSpPr>
-        <p:spPr/>
-        <p:txBody>
-          <a:bodyPr/>
-          <a:lstStyle/>
-          <a:p>
             <a:pPr lvl="0"/>
             <a:r>
               <a:rPr lang="en-US" smtClean="0"/>
@@ -799,16 +900,24 @@
             <p:ph type="dt" sz="half" idx="10"/>
           </p:nvPr>
         </p:nvSpPr>
-        <p:spPr/>
+        <p:spPr>
+          <a:xfrm>
+            <a:off x="6007690" y="548797"/>
+            <a:ext cx="1189132" cy="297918"/>
+          </a:xfrm>
+          <a:prstGeom prst="rect">
+            <a:avLst/>
+          </a:prstGeom>
+        </p:spPr>
         <p:txBody>
           <a:bodyPr/>
           <a:lstStyle/>
           <a:p>
             <a:fld id="{1BA50D42-C9CD-4801-B293-61D1F53EC57E}" type="datetimeFigureOut">
               <a:rPr lang="de-DE" smtClean="0"/>
-              <a:t>25/09/14</a:t>
+              <a:t>27.09.2014</a:t>
             </a:fld>
-            <a:endParaRPr lang="de-DE"/>
+            <a:endParaRPr lang="de-DE" dirty="0"/>
           </a:p>
         </p:txBody>
       </p:sp>
@@ -822,12 +931,20 @@
             <p:ph type="ftr" sz="quarter" idx="11"/>
           </p:nvPr>
         </p:nvSpPr>
-        <p:spPr/>
-        <p:txBody>
-          <a:bodyPr/>
-          <a:lstStyle/>
-          <a:p>
-            <a:endParaRPr lang="de-DE"/>
+        <p:spPr>
+          <a:xfrm>
+            <a:off x="6008688" y="855956"/>
+            <a:ext cx="2246489" cy="301227"/>
+          </a:xfrm>
+          <a:prstGeom prst="rect">
+            <a:avLst/>
+          </a:prstGeom>
+        </p:spPr>
+        <p:txBody>
+          <a:bodyPr/>
+          <a:lstStyle/>
+          <a:p>
+            <a:endParaRPr lang="de-DE" dirty="0"/>
           </a:p>
         </p:txBody>
       </p:sp>
@@ -841,7 +958,15 @@
             <p:ph type="sldNum" sz="quarter" idx="12"/>
           </p:nvPr>
         </p:nvSpPr>
-        <p:spPr/>
+        <p:spPr>
+          <a:xfrm>
+            <a:off x="7314415" y="548797"/>
+            <a:ext cx="941203" cy="301752"/>
+          </a:xfrm>
+          <a:prstGeom prst="rect">
+            <a:avLst/>
+          </a:prstGeom>
+        </p:spPr>
         <p:txBody>
           <a:bodyPr/>
           <a:lstStyle/>
@@ -859,6 +984,13 @@
   <p:clrMapOvr>
     <a:masterClrMapping/>
   </p:clrMapOvr>
+  <p:timing>
+    <p:tnLst>
+      <p:par>
+        <p:cTn id="1" dur="indefinite" restart="never" nodeType="tmRoot"/>
+      </p:par>
+    </p:tnLst>
+  </p:timing>
 </p:sldLayout>
 </file>
 
@@ -1038,14 +1170,22 @@
             <p:ph type="dt" sz="half" idx="10"/>
           </p:nvPr>
         </p:nvSpPr>
-        <p:spPr/>
+        <p:spPr>
+          <a:xfrm>
+            <a:off x="6007690" y="548797"/>
+            <a:ext cx="1189132" cy="297918"/>
+          </a:xfrm>
+          <a:prstGeom prst="rect">
+            <a:avLst/>
+          </a:prstGeom>
+        </p:spPr>
         <p:txBody>
           <a:bodyPr/>
           <a:lstStyle/>
           <a:p>
             <a:fld id="{1BA50D42-C9CD-4801-B293-61D1F53EC57E}" type="datetimeFigureOut">
               <a:rPr lang="de-DE" smtClean="0"/>
-              <a:t>25/09/14</a:t>
+              <a:t>27.09.2014</a:t>
             </a:fld>
             <a:endParaRPr lang="de-DE"/>
           </a:p>
@@ -1061,7 +1201,15 @@
             <p:ph type="ftr" sz="quarter" idx="11"/>
           </p:nvPr>
         </p:nvSpPr>
-        <p:spPr/>
+        <p:spPr>
+          <a:xfrm>
+            <a:off x="6008688" y="855956"/>
+            <a:ext cx="2246489" cy="301227"/>
+          </a:xfrm>
+          <a:prstGeom prst="rect">
+            <a:avLst/>
+          </a:prstGeom>
+        </p:spPr>
         <p:txBody>
           <a:bodyPr/>
           <a:lstStyle/>
@@ -1080,7 +1228,15 @@
             <p:ph type="sldNum" sz="quarter" idx="12"/>
           </p:nvPr>
         </p:nvSpPr>
-        <p:spPr/>
+        <p:spPr>
+          <a:xfrm>
+            <a:off x="7314415" y="548797"/>
+            <a:ext cx="941203" cy="301752"/>
+          </a:xfrm>
+          <a:prstGeom prst="rect">
+            <a:avLst/>
+          </a:prstGeom>
+        </p:spPr>
         <p:txBody>
           <a:bodyPr/>
           <a:lstStyle/>
@@ -1098,6 +1254,13 @@
   <p:clrMapOvr>
     <a:masterClrMapping/>
   </p:clrMapOvr>
+  <p:timing>
+    <p:tnLst>
+      <p:par>
+        <p:cTn id="1" dur="indefinite" restart="never" nodeType="tmRoot"/>
+      </p:par>
+    </p:tnLst>
+  </p:timing>
 </p:sldLayout>
 </file>
 
@@ -1128,14 +1291,22 @@
             <p:ph type="dt" sz="half" idx="10"/>
           </p:nvPr>
         </p:nvSpPr>
-        <p:spPr/>
+        <p:spPr>
+          <a:xfrm>
+            <a:off x="6007690" y="548797"/>
+            <a:ext cx="1189132" cy="297918"/>
+          </a:xfrm>
+          <a:prstGeom prst="rect">
+            <a:avLst/>
+          </a:prstGeom>
+        </p:spPr>
         <p:txBody>
           <a:bodyPr/>
           <a:lstStyle/>
           <a:p>
             <a:fld id="{1BA50D42-C9CD-4801-B293-61D1F53EC57E}" type="datetimeFigureOut">
               <a:rPr lang="de-DE" smtClean="0"/>
-              <a:t>25/09/14</a:t>
+              <a:t>27.09.2014</a:t>
             </a:fld>
             <a:endParaRPr lang="de-DE"/>
           </a:p>
@@ -1151,7 +1322,15 @@
             <p:ph type="ftr" sz="quarter" idx="11"/>
           </p:nvPr>
         </p:nvSpPr>
-        <p:spPr/>
+        <p:spPr>
+          <a:xfrm>
+            <a:off x="6008688" y="855956"/>
+            <a:ext cx="2246489" cy="301227"/>
+          </a:xfrm>
+          <a:prstGeom prst="rect">
+            <a:avLst/>
+          </a:prstGeom>
+        </p:spPr>
         <p:txBody>
           <a:bodyPr/>
           <a:lstStyle/>
@@ -1170,7 +1349,15 @@
             <p:ph type="sldNum" sz="quarter" idx="12"/>
           </p:nvPr>
         </p:nvSpPr>
-        <p:spPr/>
+        <p:spPr>
+          <a:xfrm>
+            <a:off x="7314415" y="548797"/>
+            <a:ext cx="941203" cy="301752"/>
+          </a:xfrm>
+          <a:prstGeom prst="rect">
+            <a:avLst/>
+          </a:prstGeom>
+        </p:spPr>
         <p:txBody>
           <a:bodyPr/>
           <a:lstStyle/>
@@ -1502,14 +1689,22 @@
             <p:ph type="dt" sz="half" idx="10"/>
           </p:nvPr>
         </p:nvSpPr>
-        <p:spPr/>
+        <p:spPr>
+          <a:xfrm>
+            <a:off x="6007690" y="548797"/>
+            <a:ext cx="1189132" cy="297918"/>
+          </a:xfrm>
+          <a:prstGeom prst="rect">
+            <a:avLst/>
+          </a:prstGeom>
+        </p:spPr>
         <p:txBody>
           <a:bodyPr/>
           <a:lstStyle/>
           <a:p>
             <a:fld id="{1BA50D42-C9CD-4801-B293-61D1F53EC57E}" type="datetimeFigureOut">
               <a:rPr lang="de-DE" smtClean="0"/>
-              <a:t>25/09/14</a:t>
+              <a:t>27.09.2014</a:t>
             </a:fld>
             <a:endParaRPr lang="de-DE"/>
           </a:p>
@@ -1525,7 +1720,15 @@
             <p:ph type="ftr" sz="quarter" idx="11"/>
           </p:nvPr>
         </p:nvSpPr>
-        <p:spPr/>
+        <p:spPr>
+          <a:xfrm>
+            <a:off x="6008688" y="855956"/>
+            <a:ext cx="2246489" cy="301227"/>
+          </a:xfrm>
+          <a:prstGeom prst="rect">
+            <a:avLst/>
+          </a:prstGeom>
+        </p:spPr>
         <p:txBody>
           <a:bodyPr/>
           <a:lstStyle/>
@@ -1544,7 +1747,15 @@
             <p:ph type="sldNum" sz="quarter" idx="12"/>
           </p:nvPr>
         </p:nvSpPr>
-        <p:spPr/>
+        <p:spPr>
+          <a:xfrm>
+            <a:off x="7314415" y="548797"/>
+            <a:ext cx="941203" cy="301752"/>
+          </a:xfrm>
+          <a:prstGeom prst="rect">
+            <a:avLst/>
+          </a:prstGeom>
+        </p:spPr>
         <p:txBody>
           <a:bodyPr/>
           <a:lstStyle/>
@@ -1757,14 +1968,22 @@
             <p:ph type="dt" sz="half" idx="10"/>
           </p:nvPr>
         </p:nvSpPr>
-        <p:spPr/>
+        <p:spPr>
+          <a:xfrm>
+            <a:off x="6007690" y="548797"/>
+            <a:ext cx="1189132" cy="297918"/>
+          </a:xfrm>
+          <a:prstGeom prst="rect">
+            <a:avLst/>
+          </a:prstGeom>
+        </p:spPr>
         <p:txBody>
           <a:bodyPr/>
           <a:lstStyle/>
           <a:p>
             <a:fld id="{1BA50D42-C9CD-4801-B293-61D1F53EC57E}" type="datetimeFigureOut">
               <a:rPr lang="de-DE" smtClean="0"/>
-              <a:t>25/09/14</a:t>
+              <a:t>27.09.2014</a:t>
             </a:fld>
             <a:endParaRPr lang="de-DE"/>
           </a:p>
@@ -1780,7 +1999,15 @@
             <p:ph type="ftr" sz="quarter" idx="11"/>
           </p:nvPr>
         </p:nvSpPr>
-        <p:spPr/>
+        <p:spPr>
+          <a:xfrm>
+            <a:off x="6008688" y="855956"/>
+            <a:ext cx="2246489" cy="301227"/>
+          </a:xfrm>
+          <a:prstGeom prst="rect">
+            <a:avLst/>
+          </a:prstGeom>
+        </p:spPr>
         <p:txBody>
           <a:bodyPr/>
           <a:lstStyle/>
@@ -1799,7 +2026,15 @@
             <p:ph type="sldNum" sz="quarter" idx="12"/>
           </p:nvPr>
         </p:nvSpPr>
-        <p:spPr/>
+        <p:spPr>
+          <a:xfrm>
+            <a:off x="7314415" y="548797"/>
+            <a:ext cx="941203" cy="301752"/>
+          </a:xfrm>
+          <a:prstGeom prst="rect">
+            <a:avLst/>
+          </a:prstGeom>
+        </p:spPr>
         <p:txBody>
           <a:bodyPr/>
           <a:lstStyle/>
@@ -1847,14 +2082,22 @@
             <p:ph type="dt" sz="half" idx="10"/>
           </p:nvPr>
         </p:nvSpPr>
-        <p:spPr/>
+        <p:spPr>
+          <a:xfrm>
+            <a:off x="6007690" y="548797"/>
+            <a:ext cx="1189132" cy="297918"/>
+          </a:xfrm>
+          <a:prstGeom prst="rect">
+            <a:avLst/>
+          </a:prstGeom>
+        </p:spPr>
         <p:txBody>
           <a:bodyPr/>
           <a:lstStyle/>
           <a:p>
             <a:fld id="{1BA50D42-C9CD-4801-B293-61D1F53EC57E}" type="datetimeFigureOut">
               <a:rPr lang="de-DE" smtClean="0"/>
-              <a:t>25/09/14</a:t>
+              <a:t>27.09.2014</a:t>
             </a:fld>
             <a:endParaRPr lang="de-DE"/>
           </a:p>
@@ -1870,7 +2113,15 @@
             <p:ph type="ftr" sz="quarter" idx="11"/>
           </p:nvPr>
         </p:nvSpPr>
-        <p:spPr/>
+        <p:spPr>
+          <a:xfrm>
+            <a:off x="6008688" y="855956"/>
+            <a:ext cx="2246489" cy="301227"/>
+          </a:xfrm>
+          <a:prstGeom prst="rect">
+            <a:avLst/>
+          </a:prstGeom>
+        </p:spPr>
         <p:txBody>
           <a:bodyPr/>
           <a:lstStyle/>
@@ -1889,7 +2140,15 @@
             <p:ph type="sldNum" sz="quarter" idx="12"/>
           </p:nvPr>
         </p:nvSpPr>
-        <p:spPr/>
+        <p:spPr>
+          <a:xfrm>
+            <a:off x="7314415" y="548797"/>
+            <a:ext cx="941203" cy="301752"/>
+          </a:xfrm>
+          <a:prstGeom prst="rect">
+            <a:avLst/>
+          </a:prstGeom>
+        </p:spPr>
         <p:txBody>
           <a:bodyPr/>
           <a:lstStyle/>
@@ -2121,14 +2380,22 @@
             <p:ph type="dt" sz="half" idx="10"/>
           </p:nvPr>
         </p:nvSpPr>
-        <p:spPr/>
+        <p:spPr>
+          <a:xfrm>
+            <a:off x="6007690" y="548797"/>
+            <a:ext cx="1189132" cy="297918"/>
+          </a:xfrm>
+          <a:prstGeom prst="rect">
+            <a:avLst/>
+          </a:prstGeom>
+        </p:spPr>
         <p:txBody>
           <a:bodyPr/>
           <a:lstStyle/>
           <a:p>
             <a:fld id="{1BA50D42-C9CD-4801-B293-61D1F53EC57E}" type="datetimeFigureOut">
               <a:rPr lang="de-DE" smtClean="0"/>
-              <a:t>25/09/14</a:t>
+              <a:t>27.09.2014</a:t>
             </a:fld>
             <a:endParaRPr lang="de-DE"/>
           </a:p>
@@ -2144,7 +2411,15 @@
             <p:ph type="ftr" sz="quarter" idx="11"/>
           </p:nvPr>
         </p:nvSpPr>
-        <p:spPr/>
+        <p:spPr>
+          <a:xfrm>
+            <a:off x="6008688" y="855956"/>
+            <a:ext cx="2246489" cy="301227"/>
+          </a:xfrm>
+          <a:prstGeom prst="rect">
+            <a:avLst/>
+          </a:prstGeom>
+        </p:spPr>
         <p:txBody>
           <a:bodyPr/>
           <a:lstStyle/>
@@ -2163,7 +2438,15 @@
             <p:ph type="sldNum" sz="quarter" idx="12"/>
           </p:nvPr>
         </p:nvSpPr>
-        <p:spPr/>
+        <p:spPr>
+          <a:xfrm>
+            <a:off x="7314415" y="548797"/>
+            <a:ext cx="941203" cy="301752"/>
+          </a:xfrm>
+          <a:prstGeom prst="rect">
+            <a:avLst/>
+          </a:prstGeom>
+        </p:spPr>
         <p:txBody>
           <a:bodyPr/>
           <a:lstStyle/>
@@ -2393,14 +2676,22 @@
             <p:ph type="dt" sz="half" idx="10"/>
           </p:nvPr>
         </p:nvSpPr>
-        <p:spPr/>
+        <p:spPr>
+          <a:xfrm>
+            <a:off x="6007690" y="548797"/>
+            <a:ext cx="1189132" cy="297918"/>
+          </a:xfrm>
+          <a:prstGeom prst="rect">
+            <a:avLst/>
+          </a:prstGeom>
+        </p:spPr>
         <p:txBody>
           <a:bodyPr/>
           <a:lstStyle/>
           <a:p>
             <a:fld id="{1BA50D42-C9CD-4801-B293-61D1F53EC57E}" type="datetimeFigureOut">
               <a:rPr lang="de-DE" smtClean="0"/>
-              <a:t>25/09/14</a:t>
+              <a:t>27.09.2014</a:t>
             </a:fld>
             <a:endParaRPr lang="de-DE"/>
           </a:p>
@@ -2416,7 +2707,15 @@
             <p:ph type="ftr" sz="quarter" idx="11"/>
           </p:nvPr>
         </p:nvSpPr>
-        <p:spPr/>
+        <p:spPr>
+          <a:xfrm>
+            <a:off x="6008688" y="855956"/>
+            <a:ext cx="2246489" cy="301227"/>
+          </a:xfrm>
+          <a:prstGeom prst="rect">
+            <a:avLst/>
+          </a:prstGeom>
+        </p:spPr>
         <p:txBody>
           <a:bodyPr/>
           <a:lstStyle/>
@@ -2435,7 +2734,15 @@
             <p:ph type="sldNum" sz="quarter" idx="12"/>
           </p:nvPr>
         </p:nvSpPr>
-        <p:spPr/>
+        <p:spPr>
+          <a:xfrm>
+            <a:off x="7314415" y="548797"/>
+            <a:ext cx="941203" cy="301752"/>
+          </a:xfrm>
+          <a:prstGeom prst="rect">
+            <a:avLst/>
+          </a:prstGeom>
+        </p:spPr>
         <p:txBody>
           <a:bodyPr/>
           <a:lstStyle/>
@@ -2482,7 +2789,7 @@
         <p:nvSpPr>
           <p:cNvPr id="10" name="Rectangle 9"/>
           <p:cNvSpPr/>
-          <p:nvPr/>
+          <p:nvPr userDrawn="1"/>
         </p:nvSpPr>
         <p:spPr>
           <a:xfrm>
@@ -2582,21 +2889,22 @@
         </p:nvSpPr>
         <p:spPr>
           <a:xfrm>
-            <a:off x="914400" y="1544715"/>
-            <a:ext cx="7315200" cy="1154097"/>
+            <a:off x="538480" y="114663"/>
+            <a:ext cx="7691120" cy="1154097"/>
           </a:xfrm>
           <a:prstGeom prst="rect">
             <a:avLst/>
           </a:prstGeom>
         </p:spPr>
         <p:txBody>
-          <a:bodyPr vert="horz" lIns="91440" tIns="45720" rIns="91440" bIns="45720" rtlCol="0" anchor="b">
+          <a:bodyPr vert="horz" lIns="91440" tIns="45720" rIns="91440" bIns="45720" rtlCol="0" anchor="t">
             <a:normAutofit/>
           </a:bodyPr>
           <a:lstStyle/>
           <a:p>
-            <a:r>
-              <a:rPr lang="en-US" smtClean="0"/>
+            <a:pPr lvl="0"/>
+            <a:r>
+              <a:rPr lang="en-US" dirty="0" smtClean="0"/>
               <a:t>Click to edit Master title style</a:t>
             </a:r>
             <a:endParaRPr lang="en-US" dirty="0"/>
@@ -2615,8 +2923,8 @@
         </p:nvSpPr>
         <p:spPr>
           <a:xfrm>
-            <a:off x="914400" y="2769833"/>
-            <a:ext cx="7315200" cy="3539527"/>
+            <a:off x="538480" y="1412776"/>
+            <a:ext cx="8067040" cy="4896585"/>
           </a:xfrm>
           <a:prstGeom prst="rect">
             <a:avLst/>
@@ -2662,121 +2970,6 @@
               <a:t>Fifth level</a:t>
             </a:r>
             <a:endParaRPr lang="en-US" dirty="0" smtClean="0"/>
-          </a:p>
-        </p:txBody>
-      </p:sp>
-      <p:sp>
-        <p:nvSpPr>
-          <p:cNvPr id="4" name="Date Placeholder 3"/>
-          <p:cNvSpPr>
-            <a:spLocks noGrp="1"/>
-          </p:cNvSpPr>
-          <p:nvPr>
-            <p:ph type="dt" sz="half" idx="2"/>
-          </p:nvPr>
-        </p:nvSpPr>
-        <p:spPr>
-          <a:xfrm>
-            <a:off x="6007690" y="548797"/>
-            <a:ext cx="1189132" cy="297918"/>
-          </a:xfrm>
-          <a:prstGeom prst="rect">
-            <a:avLst/>
-          </a:prstGeom>
-        </p:spPr>
-        <p:txBody>
-          <a:bodyPr vert="horz" lIns="91440" tIns="45720" rIns="91440" bIns="45720" rtlCol="0" anchor="ctr"/>
-          <a:lstStyle>
-            <a:lvl1pPr algn="l">
-              <a:defRPr sz="1200">
-                <a:solidFill>
-                  <a:schemeClr val="tx1">
-                    <a:alpha val="50000"/>
-                  </a:schemeClr>
-                </a:solidFill>
-              </a:defRPr>
-            </a:lvl1pPr>
-          </a:lstStyle>
-          <a:p>
-            <a:fld id="{1BA50D42-C9CD-4801-B293-61D1F53EC57E}" type="datetimeFigureOut">
-              <a:rPr lang="de-DE" smtClean="0"/>
-              <a:t>25/09/14</a:t>
-            </a:fld>
-            <a:endParaRPr lang="de-DE"/>
-          </a:p>
-        </p:txBody>
-      </p:sp>
-      <p:sp>
-        <p:nvSpPr>
-          <p:cNvPr id="6" name="Slide Number Placeholder 5"/>
-          <p:cNvSpPr>
-            <a:spLocks noGrp="1"/>
-          </p:cNvSpPr>
-          <p:nvPr>
-            <p:ph type="sldNum" sz="quarter" idx="4"/>
-          </p:nvPr>
-        </p:nvSpPr>
-        <p:spPr>
-          <a:xfrm>
-            <a:off x="7314415" y="548797"/>
-            <a:ext cx="941203" cy="301752"/>
-          </a:xfrm>
-          <a:prstGeom prst="rect">
-            <a:avLst/>
-          </a:prstGeom>
-        </p:spPr>
-        <p:txBody>
-          <a:bodyPr vert="horz" lIns="91440" tIns="45720" rIns="91440" bIns="45720" rtlCol="0" anchor="ctr"/>
-          <a:lstStyle>
-            <a:lvl1pPr algn="r">
-              <a:defRPr sz="1200">
-                <a:solidFill>
-                  <a:schemeClr val="tx1"/>
-                </a:solidFill>
-              </a:defRPr>
-            </a:lvl1pPr>
-          </a:lstStyle>
-          <a:p>
-            <a:fld id="{6C6AE60A-B69C-4790-82F7-3882EDF23186}" type="slidenum">
-              <a:rPr lang="de-DE" smtClean="0"/>
-              <a:t>‹Nr.›</a:t>
-            </a:fld>
-            <a:endParaRPr lang="de-DE"/>
-          </a:p>
-        </p:txBody>
-      </p:sp>
-      <p:sp>
-        <p:nvSpPr>
-          <p:cNvPr id="5" name="Footer Placeholder 4"/>
-          <p:cNvSpPr>
-            <a:spLocks noGrp="1"/>
-          </p:cNvSpPr>
-          <p:nvPr>
-            <p:ph type="ftr" sz="quarter" idx="3"/>
-          </p:nvPr>
-        </p:nvSpPr>
-        <p:spPr>
-          <a:xfrm>
-            <a:off x="6008688" y="855956"/>
-            <a:ext cx="2246489" cy="301227"/>
-          </a:xfrm>
-          <a:prstGeom prst="rect">
-            <a:avLst/>
-          </a:prstGeom>
-        </p:spPr>
-        <p:txBody>
-          <a:bodyPr vert="horz" lIns="91440" tIns="0" rIns="91440" bIns="45720" rtlCol="0" anchor="t"/>
-          <a:lstStyle>
-            <a:lvl1pPr algn="l">
-              <a:defRPr sz="1000">
-                <a:solidFill>
-                  <a:schemeClr val="tx1"/>
-                </a:solidFill>
-              </a:defRPr>
-            </a:lvl1pPr>
-          </a:lstStyle>
-          <a:p>
-            <a:endParaRPr lang="de-DE"/>
           </a:p>
         </p:txBody>
       </p:sp>
@@ -2796,6 +2989,13 @@
     <p:sldLayoutId id="2147483706" r:id="rId10"/>
     <p:sldLayoutId id="2147483707" r:id="rId11"/>
   </p:sldLayoutIdLst>
+  <p:timing>
+    <p:tnLst>
+      <p:par>
+        <p:cTn id="1" dur="indefinite" restart="never" nodeType="tmRoot"/>
+      </p:par>
+    </p:tnLst>
+  </p:timing>
   <p:txStyles>
     <p:titleStyle>
       <a:lvl1pPr algn="l" defTabSz="914400" rtl="0" eaLnBrk="1" latinLnBrk="0" hangingPunct="1">
@@ -2803,7 +3003,7 @@
           <a:spcPct val="0"/>
         </a:spcBef>
         <a:buNone/>
-        <a:defRPr sz="4000" kern="1200">
+        <a:defRPr lang="en-US" sz="6000" kern="1200" dirty="0">
           <a:solidFill>
             <a:schemeClr val="tx2"/>
           </a:solidFill>
@@ -3227,7 +3427,7 @@
   <p:timing>
     <p:tnLst>
       <p:par>
-        <p:cTn xmlns:p14="http://schemas.microsoft.com/office/powerpoint/2010/main" id="1" dur="indefinite" restart="never" nodeType="tmRoot"/>
+        <p:cTn id="1" dur="indefinite" restart="never" nodeType="tmRoot"/>
       </p:par>
     </p:tnLst>
   </p:timing>
@@ -3303,11 +3503,7 @@
           <a:p>
             <a:r>
               <a:rPr lang="de-CH" dirty="0" smtClean="0"/>
-              <a:t>Mobile App</a:t>
-            </a:r>
-            <a:r>
-              <a:rPr lang="de-CH" dirty="0" smtClean="0"/>
-              <a:t>likation</a:t>
+              <a:t>Mobile Applikation</a:t>
             </a:r>
           </a:p>
           <a:p>
@@ -3321,7 +3517,6 @@
               <a:rPr lang="de-CH" dirty="0" smtClean="0"/>
               <a:t>Docker</a:t>
             </a:r>
-            <a:endParaRPr lang="de-CH" dirty="0" smtClean="0"/>
           </a:p>
         </p:txBody>
       </p:sp>
@@ -3338,7 +3533,7 @@
   <p:timing>
     <p:tnLst>
       <p:par>
-        <p:cTn xmlns:p14="http://schemas.microsoft.com/office/powerpoint/2010/main" id="1" dur="indefinite" restart="never" nodeType="tmRoot"/>
+        <p:cTn id="1" dur="indefinite" restart="never" nodeType="tmRoot"/>
       </p:par>
     </p:tnLst>
   </p:timing>
@@ -3372,12 +3567,7 @@
             <p:ph type="title"/>
           </p:nvPr>
         </p:nvSpPr>
-        <p:spPr>
-          <a:xfrm>
-            <a:off x="899592" y="548680"/>
-            <a:ext cx="7315200" cy="1154097"/>
-          </a:xfrm>
-        </p:spPr>
+        <p:spPr/>
         <p:txBody>
           <a:bodyPr anchor="t">
             <a:normAutofit/>
@@ -3402,12 +3592,7 @@
             <p:ph idx="1"/>
           </p:nvPr>
         </p:nvSpPr>
-        <p:spPr>
-          <a:xfrm>
-            <a:off x="914400" y="1700809"/>
-            <a:ext cx="7315200" cy="4608552"/>
-          </a:xfrm>
-        </p:spPr>
+        <p:spPr/>
         <p:txBody>
           <a:bodyPr/>
           <a:lstStyle/>
@@ -3425,7 +3610,7 @@
           </a:p>
           <a:p>
             <a:r>
-              <a:rPr lang="de-CH" smtClean="0"/>
+              <a:rPr lang="de-CH" dirty="0" smtClean="0"/>
               <a:t>Ende</a:t>
             </a:r>
             <a:endParaRPr lang="de-CH" dirty="0"/>
@@ -3445,7 +3630,7 @@
   <p:timing>
     <p:tnLst>
       <p:par>
-        <p:cTn xmlns:p14="http://schemas.microsoft.com/office/powerpoint/2010/main" id="1" dur="indefinite" restart="never" nodeType="tmRoot"/>
+        <p:cTn id="1" dur="indefinite" restart="never" nodeType="tmRoot"/>
       </p:par>
     </p:tnLst>
   </p:timing>
@@ -3471,7 +3656,7 @@
       </p:grpSpPr>
       <p:sp>
         <p:nvSpPr>
-          <p:cNvPr id="2" name="Title 1"/>
+          <p:cNvPr id="2" name="Titel 1"/>
           <p:cNvSpPr>
             <a:spLocks noGrp="1"/>
           </p:cNvSpPr>
@@ -3479,29 +3664,22 @@
             <p:ph type="title"/>
           </p:nvPr>
         </p:nvSpPr>
-        <p:spPr>
-          <a:xfrm>
-            <a:off x="899592" y="548680"/>
-            <a:ext cx="7315200" cy="1154097"/>
-          </a:xfrm>
-        </p:spPr>
-        <p:txBody>
-          <a:bodyPr anchor="t">
-            <a:normAutofit/>
-          </a:bodyPr>
-          <a:lstStyle/>
-          <a:p>
-            <a:r>
-              <a:rPr lang="de-CH" sz="6000" dirty="0" smtClean="0"/>
-              <a:t>Ressourcen</a:t>
-            </a:r>
-            <a:endParaRPr lang="de-CH" sz="6000" dirty="0"/>
-          </a:p>
-        </p:txBody>
-      </p:sp>
-      <p:sp>
-        <p:nvSpPr>
-          <p:cNvPr id="3" name="Content Placeholder 2"/>
+        <p:spPr/>
+        <p:txBody>
+          <a:bodyPr/>
+          <a:lstStyle/>
+          <a:p>
+            <a:r>
+              <a:rPr lang="de-CH" dirty="0" smtClean="0"/>
+              <a:t>Anforderungen</a:t>
+            </a:r>
+            <a:endParaRPr lang="de-CH" dirty="0"/>
+          </a:p>
+        </p:txBody>
+      </p:sp>
+      <p:sp>
+        <p:nvSpPr>
+          <p:cNvPr id="3" name="Inhaltsplatzhalter 2"/>
           <p:cNvSpPr>
             <a:spLocks noGrp="1"/>
           </p:cNvSpPr>
@@ -3509,16 +3687,15 @@
             <p:ph idx="1"/>
           </p:nvPr>
         </p:nvSpPr>
-        <p:spPr>
-          <a:xfrm>
-            <a:off x="914400" y="1700809"/>
-            <a:ext cx="7315200" cy="4608552"/>
-          </a:xfrm>
-        </p:spPr>
-        <p:txBody>
-          <a:bodyPr/>
-          <a:lstStyle/>
-          <a:p>
+        <p:spPr/>
+        <p:txBody>
+          <a:bodyPr/>
+          <a:lstStyle/>
+          <a:p>
+            <a:r>
+              <a:rPr lang="de-CH" dirty="0" err="1" smtClean="0"/>
+              <a:t>my</a:t>
+            </a:r>
             <a:endParaRPr lang="de-CH" dirty="0"/>
           </a:p>
         </p:txBody>
@@ -3526,7 +3703,7 @@
     </p:spTree>
     <p:extLst>
       <p:ext uri="{BB962C8B-B14F-4D97-AF65-F5344CB8AC3E}">
-        <p14:creationId xmlns:p14="http://schemas.microsoft.com/office/powerpoint/2010/main" val="3178079573"/>
+        <p14:creationId xmlns:p14="http://schemas.microsoft.com/office/powerpoint/2010/main" val="591035820"/>
       </p:ext>
     </p:extLst>
   </p:cSld>
@@ -3536,7 +3713,7 @@
   <p:timing>
     <p:tnLst>
       <p:par>
-        <p:cTn xmlns:p14="http://schemas.microsoft.com/office/powerpoint/2010/main" id="1" dur="indefinite" restart="never" nodeType="tmRoot"/>
+        <p:cTn id="1" dur="indefinite" restart="never" nodeType="tmRoot"/>
       </p:par>
     </p:tnLst>
   </p:timing>
@@ -3570,12 +3747,7 @@
             <p:ph type="title"/>
           </p:nvPr>
         </p:nvSpPr>
-        <p:spPr>
-          <a:xfrm>
-            <a:off x="899592" y="548680"/>
-            <a:ext cx="7315200" cy="1154097"/>
-          </a:xfrm>
-        </p:spPr>
+        <p:spPr/>
         <p:txBody>
           <a:bodyPr anchor="t">
             <a:normAutofit/>
@@ -3584,7 +3756,7 @@
           <a:p>
             <a:r>
               <a:rPr lang="de-CH" sz="6000" dirty="0" smtClean="0"/>
-              <a:t>Projektablauf</a:t>
+              <a:t>Ressourcen</a:t>
             </a:r>
             <a:endParaRPr lang="de-CH" sz="6000" dirty="0"/>
           </a:p>
@@ -3592,7 +3764,7 @@
       </p:sp>
       <p:sp>
         <p:nvSpPr>
-          <p:cNvPr id="3" name="Content Placeholder 2"/>
+          <p:cNvPr id="4" name="Inhaltsplatzhalter 3"/>
           <p:cNvSpPr>
             <a:spLocks noGrp="1"/>
           </p:cNvSpPr>
@@ -3600,16 +3772,15 @@
             <p:ph idx="1"/>
           </p:nvPr>
         </p:nvSpPr>
-        <p:spPr>
-          <a:xfrm>
-            <a:off x="914400" y="1700809"/>
-            <a:ext cx="7315200" cy="4608552"/>
-          </a:xfrm>
-        </p:spPr>
-        <p:txBody>
-          <a:bodyPr/>
-          <a:lstStyle/>
-          <a:p>
+        <p:spPr/>
+        <p:txBody>
+          <a:bodyPr/>
+          <a:lstStyle/>
+          <a:p>
+            <a:r>
+              <a:rPr lang="de-CH" dirty="0" err="1" smtClean="0"/>
+              <a:t>my</a:t>
+            </a:r>
             <a:endParaRPr lang="de-CH" dirty="0"/>
           </a:p>
         </p:txBody>
@@ -3627,7 +3798,7 @@
   <p:timing>
     <p:tnLst>
       <p:par>
-        <p:cTn xmlns:p14="http://schemas.microsoft.com/office/powerpoint/2010/main" id="1" dur="indefinite" restart="never" nodeType="tmRoot"/>
+        <p:cTn id="1" dur="indefinite" restart="never" nodeType="tmRoot"/>
       </p:par>
     </p:tnLst>
   </p:timing>
@@ -3661,12 +3832,7 @@
             <p:ph type="title"/>
           </p:nvPr>
         </p:nvSpPr>
-        <p:spPr>
-          <a:xfrm>
-            <a:off x="899592" y="548680"/>
-            <a:ext cx="7315200" cy="1154097"/>
-          </a:xfrm>
-        </p:spPr>
+        <p:spPr/>
         <p:txBody>
           <a:bodyPr anchor="t">
             <a:normAutofit/>
@@ -3675,7 +3841,7 @@
           <a:p>
             <a:r>
               <a:rPr lang="de-CH" sz="6000" dirty="0" smtClean="0"/>
-              <a:t>Risiken</a:t>
+              <a:t>Projektablauf</a:t>
             </a:r>
             <a:endParaRPr lang="de-CH" sz="6000" dirty="0"/>
           </a:p>
@@ -3683,7 +3849,7 @@
       </p:sp>
       <p:sp>
         <p:nvSpPr>
-          <p:cNvPr id="3" name="Content Placeholder 2"/>
+          <p:cNvPr id="4" name="Inhaltsplatzhalter 3"/>
           <p:cNvSpPr>
             <a:spLocks noGrp="1"/>
           </p:cNvSpPr>
@@ -3691,17 +3857,12 @@
             <p:ph idx="1"/>
           </p:nvPr>
         </p:nvSpPr>
-        <p:spPr>
-          <a:xfrm>
-            <a:off x="914400" y="1700809"/>
-            <a:ext cx="7315200" cy="4608552"/>
-          </a:xfrm>
-        </p:spPr>
-        <p:txBody>
-          <a:bodyPr/>
-          <a:lstStyle/>
-          <a:p>
-            <a:endParaRPr lang="de-CH" dirty="0"/>
+        <p:spPr/>
+        <p:txBody>
+          <a:bodyPr/>
+          <a:lstStyle/>
+          <a:p>
+            <a:endParaRPr lang="de-CH"/>
           </a:p>
         </p:txBody>
       </p:sp>
@@ -3718,7 +3879,7 @@
   <p:timing>
     <p:tnLst>
       <p:par>
-        <p:cTn xmlns:p14="http://schemas.microsoft.com/office/powerpoint/2010/main" id="1" dur="indefinite" restart="never" nodeType="tmRoot"/>
+        <p:cTn id="1" dur="indefinite" restart="never" nodeType="tmRoot"/>
       </p:par>
     </p:tnLst>
   </p:timing>
@@ -3752,12 +3913,7 @@
             <p:ph type="title"/>
           </p:nvPr>
         </p:nvSpPr>
-        <p:spPr>
-          <a:xfrm>
-            <a:off x="899592" y="548680"/>
-            <a:ext cx="7315200" cy="1154097"/>
-          </a:xfrm>
-        </p:spPr>
+        <p:spPr/>
         <p:txBody>
           <a:bodyPr anchor="t">
             <a:normAutofit/>
@@ -3766,7 +3922,7 @@
           <a:p>
             <a:r>
               <a:rPr lang="de-CH" sz="6000" dirty="0" smtClean="0"/>
-              <a:t>Kundennutzung</a:t>
+              <a:t>Risiken</a:t>
             </a:r>
             <a:endParaRPr lang="de-CH" sz="6000" dirty="0"/>
           </a:p>
@@ -3774,7 +3930,7 @@
       </p:sp>
       <p:sp>
         <p:nvSpPr>
-          <p:cNvPr id="3" name="Content Placeholder 2"/>
+          <p:cNvPr id="4" name="Inhaltsplatzhalter 3"/>
           <p:cNvSpPr>
             <a:spLocks noGrp="1"/>
           </p:cNvSpPr>
@@ -3782,17 +3938,12 @@
             <p:ph idx="1"/>
           </p:nvPr>
         </p:nvSpPr>
-        <p:spPr>
-          <a:xfrm>
-            <a:off x="914400" y="1700809"/>
-            <a:ext cx="7315200" cy="4608552"/>
-          </a:xfrm>
-        </p:spPr>
-        <p:txBody>
-          <a:bodyPr/>
-          <a:lstStyle/>
-          <a:p>
-            <a:endParaRPr lang="de-CH" dirty="0"/>
+        <p:spPr/>
+        <p:txBody>
+          <a:bodyPr/>
+          <a:lstStyle/>
+          <a:p>
+            <a:endParaRPr lang="de-CH"/>
           </a:p>
         </p:txBody>
       </p:sp>
@@ -3809,7 +3960,7 @@
   <p:timing>
     <p:tnLst>
       <p:par>
-        <p:cTn xmlns:p14="http://schemas.microsoft.com/office/powerpoint/2010/main" id="1" dur="indefinite" restart="never" nodeType="tmRoot"/>
+        <p:cTn id="1" dur="indefinite" restart="never" nodeType="tmRoot"/>
       </p:par>
     </p:tnLst>
   </p:timing>
@@ -3843,12 +3994,7 @@
             <p:ph type="title"/>
           </p:nvPr>
         </p:nvSpPr>
-        <p:spPr>
-          <a:xfrm>
-            <a:off x="899592" y="548680"/>
-            <a:ext cx="7315200" cy="1154097"/>
-          </a:xfrm>
-        </p:spPr>
+        <p:spPr/>
         <p:txBody>
           <a:bodyPr anchor="t">
             <a:normAutofit/>
@@ -3857,7 +4003,7 @@
           <a:p>
             <a:r>
               <a:rPr lang="de-CH" sz="6000" dirty="0" smtClean="0"/>
-              <a:t>Wirtschaftlichkeit</a:t>
+              <a:t>Kundennutzung</a:t>
             </a:r>
             <a:endParaRPr lang="de-CH" sz="6000" dirty="0"/>
           </a:p>
@@ -3865,7 +4011,7 @@
       </p:sp>
       <p:sp>
         <p:nvSpPr>
-          <p:cNvPr id="3" name="Content Placeholder 2"/>
+          <p:cNvPr id="4" name="Inhaltsplatzhalter 3"/>
           <p:cNvSpPr>
             <a:spLocks noGrp="1"/>
           </p:cNvSpPr>
@@ -3873,17 +4019,12 @@
             <p:ph idx="1"/>
           </p:nvPr>
         </p:nvSpPr>
-        <p:spPr>
-          <a:xfrm>
-            <a:off x="914400" y="1700809"/>
-            <a:ext cx="7315200" cy="4608552"/>
-          </a:xfrm>
-        </p:spPr>
-        <p:txBody>
-          <a:bodyPr/>
-          <a:lstStyle/>
-          <a:p>
-            <a:endParaRPr lang="de-CH" dirty="0"/>
+        <p:spPr/>
+        <p:txBody>
+          <a:bodyPr/>
+          <a:lstStyle/>
+          <a:p>
+            <a:endParaRPr lang="de-CH"/>
           </a:p>
         </p:txBody>
       </p:sp>
@@ -3900,7 +4041,88 @@
   <p:timing>
     <p:tnLst>
       <p:par>
-        <p:cTn xmlns:p14="http://schemas.microsoft.com/office/powerpoint/2010/main" id="1" dur="indefinite" restart="never" nodeType="tmRoot"/>
+        <p:cTn id="1" dur="indefinite" restart="never" nodeType="tmRoot"/>
+      </p:par>
+    </p:tnLst>
+  </p:timing>
+</p:sld>
+</file>
+
+<file path=ppt/slides/slide9.xml><?xml version="1.0" encoding="utf-8"?>
+<p:sld xmlns:a="http://schemas.openxmlformats.org/drawingml/2006/main" xmlns:r="http://schemas.openxmlformats.org/officeDocument/2006/relationships" xmlns:p="http://schemas.openxmlformats.org/presentationml/2006/main">
+  <p:cSld>
+    <p:spTree>
+      <p:nvGrpSpPr>
+        <p:cNvPr id="1" name=""/>
+        <p:cNvGrpSpPr/>
+        <p:nvPr/>
+      </p:nvGrpSpPr>
+      <p:grpSpPr>
+        <a:xfrm>
+          <a:off x="0" y="0"/>
+          <a:ext cx="0" cy="0"/>
+          <a:chOff x="0" y="0"/>
+          <a:chExt cx="0" cy="0"/>
+        </a:xfrm>
+      </p:grpSpPr>
+      <p:sp>
+        <p:nvSpPr>
+          <p:cNvPr id="2" name="Title 1"/>
+          <p:cNvSpPr>
+            <a:spLocks noGrp="1"/>
+          </p:cNvSpPr>
+          <p:nvPr>
+            <p:ph type="title"/>
+          </p:nvPr>
+        </p:nvSpPr>
+        <p:spPr/>
+        <p:txBody>
+          <a:bodyPr anchor="t">
+            <a:normAutofit/>
+          </a:bodyPr>
+          <a:lstStyle/>
+          <a:p>
+            <a:r>
+              <a:rPr lang="de-CH" sz="6000" dirty="0" smtClean="0"/>
+              <a:t>Wirtschaftlichkeit</a:t>
+            </a:r>
+            <a:endParaRPr lang="de-CH" sz="6000" dirty="0"/>
+          </a:p>
+        </p:txBody>
+      </p:sp>
+      <p:sp>
+        <p:nvSpPr>
+          <p:cNvPr id="4" name="Inhaltsplatzhalter 3"/>
+          <p:cNvSpPr>
+            <a:spLocks noGrp="1"/>
+          </p:cNvSpPr>
+          <p:nvPr>
+            <p:ph idx="1"/>
+          </p:nvPr>
+        </p:nvSpPr>
+        <p:spPr/>
+        <p:txBody>
+          <a:bodyPr/>
+          <a:lstStyle/>
+          <a:p>
+            <a:endParaRPr lang="de-CH"/>
+          </a:p>
+        </p:txBody>
+      </p:sp>
+    </p:spTree>
+    <p:extLst>
+      <p:ext uri="{BB962C8B-B14F-4D97-AF65-F5344CB8AC3E}">
+        <p14:creationId xmlns:p14="http://schemas.microsoft.com/office/powerpoint/2010/main" val="3178079573"/>
+      </p:ext>
+    </p:extLst>
+  </p:cSld>
+  <p:clrMapOvr>
+    <a:masterClrMapping/>
+  </p:clrMapOvr>
+  <p:timing>
+    <p:tnLst>
+      <p:par>
+        <p:cTn id="1" dur="indefinite" restart="never" nodeType="tmRoot"/>
       </p:par>
     </p:tnLst>
   </p:timing>

</xml_diff>